<commit_message>
Update slide for Unit2
Update slide for Unit2 adb
</commit_message>
<xml_diff>
--- a/unit2_adb/setup_adb.pptx
+++ b/unit2_adb/setup_adb.pptx
@@ -4772,12 +4772,12 @@
               <a:p>
                 <a:pPr algn="ctr"/>
                 <a:r>
-                  <a:rPr lang="en-US" sz="1100">
+                  <a:rPr lang="en-US" sz="1100" dirty="0">
                     <a:solidFill>
                       <a:sysClr val="windowText" lastClr="000000"/>
                     </a:solidFill>
                   </a:rPr>
-                  <a:t>Android application</a:t>
+                  <a:t>Linux Application</a:t>
                 </a:r>
               </a:p>
             </p:txBody>
@@ -4927,7 +4927,7 @@
               <a:p>
                 <a:pPr marL="0" indent="0" algn="ctr"/>
                 <a:r>
-                  <a:rPr lang="en-US" sz="1100">
+                  <a:rPr lang="en-US" sz="1100" dirty="0">
                     <a:solidFill>
                       <a:sysClr val="windowText" lastClr="000000"/>
                     </a:solidFill>
@@ -4935,7 +4935,7 @@
                     <a:ea typeface="+mn-ea"/>
                     <a:cs typeface="+mn-cs"/>
                   </a:rPr>
-                  <a:t>Contacts</a:t>
+                  <a:t>/dev</a:t>
                 </a:r>
               </a:p>
             </p:txBody>
@@ -5085,16 +5085,21 @@
               <a:p>
                 <a:pPr marL="0" indent="0" algn="ctr"/>
                 <a:r>
-                  <a:rPr lang="en-US" sz="1100">
+                  <a:rPr lang="en-US" dirty="0">
                     <a:solidFill>
                       <a:sysClr val="windowText" lastClr="000000"/>
                     </a:solidFill>
-                    <a:latin typeface="+mn-lt"/>
-                    <a:ea typeface="+mn-ea"/>
-                    <a:cs typeface="+mn-cs"/>
                   </a:rPr>
-                  <a:t>Photos</a:t>
+                  <a:t>/proc</a:t>
                 </a:r>
+                <a:endParaRPr lang="en-US" sz="1100" dirty="0">
+                  <a:solidFill>
+                    <a:sysClr val="windowText" lastClr="000000"/>
+                  </a:solidFill>
+                  <a:latin typeface="+mn-lt"/>
+                  <a:ea typeface="+mn-ea"/>
+                  <a:cs typeface="+mn-cs"/>
+                </a:endParaRPr>
               </a:p>
             </p:txBody>
           </p:sp>
@@ -5243,16 +5248,21 @@
               <a:p>
                 <a:pPr marL="0" indent="0" algn="ctr"/>
                 <a:r>
-                  <a:rPr lang="en-US" sz="1100">
+                  <a:rPr lang="en-US" dirty="0" err="1">
                     <a:solidFill>
                       <a:sysClr val="windowText" lastClr="000000"/>
                     </a:solidFill>
-                    <a:latin typeface="+mn-lt"/>
-                    <a:ea typeface="+mn-ea"/>
-                    <a:cs typeface="+mn-cs"/>
                   </a:rPr>
-                  <a:t>Messages</a:t>
+                  <a:t>dmesg</a:t>
                 </a:r>
+                <a:endParaRPr lang="en-US" sz="1100" dirty="0">
+                  <a:solidFill>
+                    <a:sysClr val="windowText" lastClr="000000"/>
+                  </a:solidFill>
+                  <a:latin typeface="+mn-lt"/>
+                  <a:ea typeface="+mn-ea"/>
+                  <a:cs typeface="+mn-cs"/>
+                </a:endParaRPr>
               </a:p>
             </p:txBody>
           </p:sp>

</xml_diff>